<commit_message>
Tutorial 5 on going
</commit_message>
<xml_diff>
--- a/sources/tuto.pptx
+++ b/sources/tuto.pptx
@@ -7,6 +7,7 @@
   <p:sldIdLst>
     <p:sldId id="256" r:id="rId2"/>
     <p:sldId id="257" r:id="rId3"/>
+    <p:sldId id="258" r:id="rId4"/>
   </p:sldIdLst>
   <p:sldSz cx="12192000" cy="6858000"/>
   <p:notesSz cx="6858000" cy="9144000"/>
@@ -105,6 +106,11 @@
       </a:defRPr>
     </a:lvl9pPr>
   </p:defaultTextStyle>
+  <p:extLst>
+    <p:ext uri="{EFAFB233-063F-42B5-8137-9DF3F51BA10A}">
+      <p15:sldGuideLst xmlns:p15="http://schemas.microsoft.com/office/powerpoint/2012/main"/>
+    </p:ext>
+  </p:extLst>
 </p:presentation>
 </file>
 
@@ -239,7 +245,7 @@
           <a:p>
             <a:fld id="{07231EA3-92E1-4FA8-95C5-13506DDAF359}" type="datetimeFigureOut">
               <a:rPr lang="en-GB" smtClean="0"/>
-              <a:t>15/05/2018</a:t>
+              <a:t>28/05/2018</a:t>
             </a:fld>
             <a:endParaRPr lang="en-GB"/>
           </a:p>
@@ -409,7 +415,7 @@
           <a:p>
             <a:fld id="{07231EA3-92E1-4FA8-95C5-13506DDAF359}" type="datetimeFigureOut">
               <a:rPr lang="en-GB" smtClean="0"/>
-              <a:t>15/05/2018</a:t>
+              <a:t>28/05/2018</a:t>
             </a:fld>
             <a:endParaRPr lang="en-GB"/>
           </a:p>
@@ -589,7 +595,7 @@
           <a:p>
             <a:fld id="{07231EA3-92E1-4FA8-95C5-13506DDAF359}" type="datetimeFigureOut">
               <a:rPr lang="en-GB" smtClean="0"/>
-              <a:t>15/05/2018</a:t>
+              <a:t>28/05/2018</a:t>
             </a:fld>
             <a:endParaRPr lang="en-GB"/>
           </a:p>
@@ -759,7 +765,7 @@
           <a:p>
             <a:fld id="{07231EA3-92E1-4FA8-95C5-13506DDAF359}" type="datetimeFigureOut">
               <a:rPr lang="en-GB" smtClean="0"/>
-              <a:t>15/05/2018</a:t>
+              <a:t>28/05/2018</a:t>
             </a:fld>
             <a:endParaRPr lang="en-GB"/>
           </a:p>
@@ -1005,7 +1011,7 @@
           <a:p>
             <a:fld id="{07231EA3-92E1-4FA8-95C5-13506DDAF359}" type="datetimeFigureOut">
               <a:rPr lang="en-GB" smtClean="0"/>
-              <a:t>15/05/2018</a:t>
+              <a:t>28/05/2018</a:t>
             </a:fld>
             <a:endParaRPr lang="en-GB"/>
           </a:p>
@@ -1237,7 +1243,7 @@
           <a:p>
             <a:fld id="{07231EA3-92E1-4FA8-95C5-13506DDAF359}" type="datetimeFigureOut">
               <a:rPr lang="en-GB" smtClean="0"/>
-              <a:t>15/05/2018</a:t>
+              <a:t>28/05/2018</a:t>
             </a:fld>
             <a:endParaRPr lang="en-GB"/>
           </a:p>
@@ -1604,7 +1610,7 @@
           <a:p>
             <a:fld id="{07231EA3-92E1-4FA8-95C5-13506DDAF359}" type="datetimeFigureOut">
               <a:rPr lang="en-GB" smtClean="0"/>
-              <a:t>15/05/2018</a:t>
+              <a:t>28/05/2018</a:t>
             </a:fld>
             <a:endParaRPr lang="en-GB"/>
           </a:p>
@@ -1722,7 +1728,7 @@
           <a:p>
             <a:fld id="{07231EA3-92E1-4FA8-95C5-13506DDAF359}" type="datetimeFigureOut">
               <a:rPr lang="en-GB" smtClean="0"/>
-              <a:t>15/05/2018</a:t>
+              <a:t>28/05/2018</a:t>
             </a:fld>
             <a:endParaRPr lang="en-GB"/>
           </a:p>
@@ -1817,7 +1823,7 @@
           <a:p>
             <a:fld id="{07231EA3-92E1-4FA8-95C5-13506DDAF359}" type="datetimeFigureOut">
               <a:rPr lang="en-GB" smtClean="0"/>
-              <a:t>15/05/2018</a:t>
+              <a:t>28/05/2018</a:t>
             </a:fld>
             <a:endParaRPr lang="en-GB"/>
           </a:p>
@@ -2094,7 +2100,7 @@
           <a:p>
             <a:fld id="{07231EA3-92E1-4FA8-95C5-13506DDAF359}" type="datetimeFigureOut">
               <a:rPr lang="en-GB" smtClean="0"/>
-              <a:t>15/05/2018</a:t>
+              <a:t>28/05/2018</a:t>
             </a:fld>
             <a:endParaRPr lang="en-GB"/>
           </a:p>
@@ -2347,7 +2353,7 @@
           <a:p>
             <a:fld id="{07231EA3-92E1-4FA8-95C5-13506DDAF359}" type="datetimeFigureOut">
               <a:rPr lang="en-GB" smtClean="0"/>
-              <a:t>15/05/2018</a:t>
+              <a:t>28/05/2018</a:t>
             </a:fld>
             <a:endParaRPr lang="en-GB"/>
           </a:p>
@@ -2560,7 +2566,7 @@
           <a:p>
             <a:fld id="{07231EA3-92E1-4FA8-95C5-13506DDAF359}" type="datetimeFigureOut">
               <a:rPr lang="en-GB" smtClean="0"/>
-              <a:t>15/05/2018</a:t>
+              <a:t>28/05/2018</a:t>
             </a:fld>
             <a:endParaRPr lang="en-GB"/>
           </a:p>
@@ -4274,6 +4280,917 @@
 </p:sld>
 </file>
 
+<file path=ppt/slides/slide3.xml><?xml version="1.0" encoding="utf-8"?>
+<p:sld xmlns:a="http://schemas.openxmlformats.org/drawingml/2006/main" xmlns:r="http://schemas.openxmlformats.org/officeDocument/2006/relationships" xmlns:p="http://schemas.openxmlformats.org/presentationml/2006/main">
+  <p:cSld>
+    <p:spTree>
+      <p:nvGrpSpPr>
+        <p:cNvPr id="1" name=""/>
+        <p:cNvGrpSpPr/>
+        <p:nvPr/>
+      </p:nvGrpSpPr>
+      <p:grpSpPr>
+        <a:xfrm>
+          <a:off x="0" y="0"/>
+          <a:ext cx="0" cy="0"/>
+          <a:chOff x="0" y="0"/>
+          <a:chExt cx="0" cy="0"/>
+        </a:xfrm>
+      </p:grpSpPr>
+      <p:sp>
+        <p:nvSpPr>
+          <p:cNvPr id="9" name="Flèche à quatre pointes 8"/>
+          <p:cNvSpPr/>
+          <p:nvPr/>
+        </p:nvSpPr>
+        <p:spPr>
+          <a:xfrm>
+            <a:off x="2484736" y="902728"/>
+            <a:ext cx="4221207" cy="4221207"/>
+          </a:xfrm>
+          <a:prstGeom prst="quadArrow">
+            <a:avLst>
+              <a:gd name="adj1" fmla="val 2000"/>
+              <a:gd name="adj2" fmla="val 4000"/>
+              <a:gd name="adj3" fmla="val 5000"/>
+            </a:avLst>
+          </a:prstGeom>
+        </p:spPr>
+        <p:style>
+          <a:lnRef idx="1">
+            <a:schemeClr val="dk1"/>
+          </a:lnRef>
+          <a:fillRef idx="2">
+            <a:schemeClr val="dk1"/>
+          </a:fillRef>
+          <a:effectRef idx="1">
+            <a:schemeClr val="dk1"/>
+          </a:effectRef>
+          <a:fontRef idx="minor">
+            <a:schemeClr val="dk1"/>
+          </a:fontRef>
+        </p:style>
+      </p:sp>
+      <p:sp>
+        <p:nvSpPr>
+          <p:cNvPr id="10" name="Forme libre 9"/>
+          <p:cNvSpPr/>
+          <p:nvPr/>
+        </p:nvSpPr>
+        <p:spPr>
+          <a:xfrm>
+            <a:off x="2759114" y="1177106"/>
+            <a:ext cx="1688482" cy="1688482"/>
+          </a:xfrm>
+          <a:custGeom>
+            <a:avLst/>
+            <a:gdLst>
+              <a:gd name="connsiteX0" fmla="*/ 0 w 1688482"/>
+              <a:gd name="connsiteY0" fmla="*/ 281419 h 1688482"/>
+              <a:gd name="connsiteX1" fmla="*/ 281419 w 1688482"/>
+              <a:gd name="connsiteY1" fmla="*/ 0 h 1688482"/>
+              <a:gd name="connsiteX2" fmla="*/ 1407063 w 1688482"/>
+              <a:gd name="connsiteY2" fmla="*/ 0 h 1688482"/>
+              <a:gd name="connsiteX3" fmla="*/ 1688482 w 1688482"/>
+              <a:gd name="connsiteY3" fmla="*/ 281419 h 1688482"/>
+              <a:gd name="connsiteX4" fmla="*/ 1688482 w 1688482"/>
+              <a:gd name="connsiteY4" fmla="*/ 1407063 h 1688482"/>
+              <a:gd name="connsiteX5" fmla="*/ 1407063 w 1688482"/>
+              <a:gd name="connsiteY5" fmla="*/ 1688482 h 1688482"/>
+              <a:gd name="connsiteX6" fmla="*/ 281419 w 1688482"/>
+              <a:gd name="connsiteY6" fmla="*/ 1688482 h 1688482"/>
+              <a:gd name="connsiteX7" fmla="*/ 0 w 1688482"/>
+              <a:gd name="connsiteY7" fmla="*/ 1407063 h 1688482"/>
+              <a:gd name="connsiteX8" fmla="*/ 0 w 1688482"/>
+              <a:gd name="connsiteY8" fmla="*/ 281419 h 1688482"/>
+            </a:gdLst>
+            <a:ahLst/>
+            <a:cxnLst>
+              <a:cxn ang="0">
+                <a:pos x="connsiteX0" y="connsiteY0"/>
+              </a:cxn>
+              <a:cxn ang="0">
+                <a:pos x="connsiteX1" y="connsiteY1"/>
+              </a:cxn>
+              <a:cxn ang="0">
+                <a:pos x="connsiteX2" y="connsiteY2"/>
+              </a:cxn>
+              <a:cxn ang="0">
+                <a:pos x="connsiteX3" y="connsiteY3"/>
+              </a:cxn>
+              <a:cxn ang="0">
+                <a:pos x="connsiteX4" y="connsiteY4"/>
+              </a:cxn>
+              <a:cxn ang="0">
+                <a:pos x="connsiteX5" y="connsiteY5"/>
+              </a:cxn>
+              <a:cxn ang="0">
+                <a:pos x="connsiteX6" y="connsiteY6"/>
+              </a:cxn>
+              <a:cxn ang="0">
+                <a:pos x="connsiteX7" y="connsiteY7"/>
+              </a:cxn>
+              <a:cxn ang="0">
+                <a:pos x="connsiteX8" y="connsiteY8"/>
+              </a:cxn>
+            </a:cxnLst>
+            <a:rect l="l" t="t" r="r" b="b"/>
+            <a:pathLst>
+              <a:path w="1688482" h="1688482">
+                <a:moveTo>
+                  <a:pt x="0" y="281419"/>
+                </a:moveTo>
+                <a:cubicBezTo>
+                  <a:pt x="0" y="125996"/>
+                  <a:pt x="125996" y="0"/>
+                  <a:pt x="281419" y="0"/>
+                </a:cubicBezTo>
+                <a:lnTo>
+                  <a:pt x="1407063" y="0"/>
+                </a:lnTo>
+                <a:cubicBezTo>
+                  <a:pt x="1562486" y="0"/>
+                  <a:pt x="1688482" y="125996"/>
+                  <a:pt x="1688482" y="281419"/>
+                </a:cubicBezTo>
+                <a:lnTo>
+                  <a:pt x="1688482" y="1407063"/>
+                </a:lnTo>
+                <a:cubicBezTo>
+                  <a:pt x="1688482" y="1562486"/>
+                  <a:pt x="1562486" y="1688482"/>
+                  <a:pt x="1407063" y="1688482"/>
+                </a:cubicBezTo>
+                <a:lnTo>
+                  <a:pt x="281419" y="1688482"/>
+                </a:lnTo>
+                <a:cubicBezTo>
+                  <a:pt x="125996" y="1688482"/>
+                  <a:pt x="0" y="1562486"/>
+                  <a:pt x="0" y="1407063"/>
+                </a:cubicBezTo>
+                <a:lnTo>
+                  <a:pt x="0" y="281419"/>
+                </a:lnTo>
+                <a:close/>
+              </a:path>
+            </a:pathLst>
+          </a:custGeom>
+        </p:spPr>
+        <p:style>
+          <a:lnRef idx="2">
+            <a:schemeClr val="lt1">
+              <a:hueOff val="0"/>
+              <a:satOff val="0"/>
+              <a:lumOff val="0"/>
+              <a:alphaOff val="0"/>
+            </a:schemeClr>
+          </a:lnRef>
+          <a:fillRef idx="1">
+            <a:schemeClr val="accent2">
+              <a:hueOff val="0"/>
+              <a:satOff val="0"/>
+              <a:lumOff val="0"/>
+              <a:alphaOff val="0"/>
+            </a:schemeClr>
+          </a:fillRef>
+          <a:effectRef idx="0">
+            <a:schemeClr val="accent2">
+              <a:hueOff val="0"/>
+              <a:satOff val="0"/>
+              <a:lumOff val="0"/>
+              <a:alphaOff val="0"/>
+            </a:schemeClr>
+          </a:effectRef>
+          <a:fontRef idx="minor">
+            <a:schemeClr val="lt1"/>
+          </a:fontRef>
+        </p:style>
+        <p:txBody>
+          <a:bodyPr spcFirstLastPara="0" vert="horz" wrap="square" lIns="173865" tIns="173865" rIns="173865" bIns="173865" numCol="1" spcCol="1270" anchor="ctr" anchorCtr="0">
+            <a:noAutofit/>
+          </a:bodyPr>
+          <a:lstStyle/>
+          <a:p>
+            <a:pPr lvl="0" algn="ctr" defTabSz="1066800">
+              <a:lnSpc>
+                <a:spcPct val="90000"/>
+              </a:lnSpc>
+              <a:spcBef>
+                <a:spcPct val="0"/>
+              </a:spcBef>
+              <a:spcAft>
+                <a:spcPct val="35000"/>
+              </a:spcAft>
+            </a:pPr>
+            <a:r>
+              <a:rPr lang="fr-FR" sz="1600"/>
+              <a:t>Livré </a:t>
+            </a:r>
+            <a:r>
+              <a:rPr lang="fr-FR" sz="1600"/>
+              <a:t>avec </a:t>
+            </a:r>
+            <a:r>
+              <a:rPr lang="fr-FR" sz="1600" smtClean="0"/>
+              <a:t>SynApps</a:t>
+            </a:r>
+            <a:endParaRPr lang="en-GB" sz="1600"/>
+          </a:p>
+        </p:txBody>
+      </p:sp>
+      <p:sp>
+        <p:nvSpPr>
+          <p:cNvPr id="11" name="Forme libre 10"/>
+          <p:cNvSpPr/>
+          <p:nvPr/>
+        </p:nvSpPr>
+        <p:spPr>
+          <a:xfrm>
+            <a:off x="4743082" y="1177106"/>
+            <a:ext cx="1688482" cy="1688482"/>
+          </a:xfrm>
+          <a:custGeom>
+            <a:avLst/>
+            <a:gdLst>
+              <a:gd name="connsiteX0" fmla="*/ 0 w 1688482"/>
+              <a:gd name="connsiteY0" fmla="*/ 281419 h 1688482"/>
+              <a:gd name="connsiteX1" fmla="*/ 281419 w 1688482"/>
+              <a:gd name="connsiteY1" fmla="*/ 0 h 1688482"/>
+              <a:gd name="connsiteX2" fmla="*/ 1407063 w 1688482"/>
+              <a:gd name="connsiteY2" fmla="*/ 0 h 1688482"/>
+              <a:gd name="connsiteX3" fmla="*/ 1688482 w 1688482"/>
+              <a:gd name="connsiteY3" fmla="*/ 281419 h 1688482"/>
+              <a:gd name="connsiteX4" fmla="*/ 1688482 w 1688482"/>
+              <a:gd name="connsiteY4" fmla="*/ 1407063 h 1688482"/>
+              <a:gd name="connsiteX5" fmla="*/ 1407063 w 1688482"/>
+              <a:gd name="connsiteY5" fmla="*/ 1688482 h 1688482"/>
+              <a:gd name="connsiteX6" fmla="*/ 281419 w 1688482"/>
+              <a:gd name="connsiteY6" fmla="*/ 1688482 h 1688482"/>
+              <a:gd name="connsiteX7" fmla="*/ 0 w 1688482"/>
+              <a:gd name="connsiteY7" fmla="*/ 1407063 h 1688482"/>
+              <a:gd name="connsiteX8" fmla="*/ 0 w 1688482"/>
+              <a:gd name="connsiteY8" fmla="*/ 281419 h 1688482"/>
+            </a:gdLst>
+            <a:ahLst/>
+            <a:cxnLst>
+              <a:cxn ang="0">
+                <a:pos x="connsiteX0" y="connsiteY0"/>
+              </a:cxn>
+              <a:cxn ang="0">
+                <a:pos x="connsiteX1" y="connsiteY1"/>
+              </a:cxn>
+              <a:cxn ang="0">
+                <a:pos x="connsiteX2" y="connsiteY2"/>
+              </a:cxn>
+              <a:cxn ang="0">
+                <a:pos x="connsiteX3" y="connsiteY3"/>
+              </a:cxn>
+              <a:cxn ang="0">
+                <a:pos x="connsiteX4" y="connsiteY4"/>
+              </a:cxn>
+              <a:cxn ang="0">
+                <a:pos x="connsiteX5" y="connsiteY5"/>
+              </a:cxn>
+              <a:cxn ang="0">
+                <a:pos x="connsiteX6" y="connsiteY6"/>
+              </a:cxn>
+              <a:cxn ang="0">
+                <a:pos x="connsiteX7" y="connsiteY7"/>
+              </a:cxn>
+              <a:cxn ang="0">
+                <a:pos x="connsiteX8" y="connsiteY8"/>
+              </a:cxn>
+            </a:cxnLst>
+            <a:rect l="l" t="t" r="r" b="b"/>
+            <a:pathLst>
+              <a:path w="1688482" h="1688482">
+                <a:moveTo>
+                  <a:pt x="0" y="281419"/>
+                </a:moveTo>
+                <a:cubicBezTo>
+                  <a:pt x="0" y="125996"/>
+                  <a:pt x="125996" y="0"/>
+                  <a:pt x="281419" y="0"/>
+                </a:cubicBezTo>
+                <a:lnTo>
+                  <a:pt x="1407063" y="0"/>
+                </a:lnTo>
+                <a:cubicBezTo>
+                  <a:pt x="1562486" y="0"/>
+                  <a:pt x="1688482" y="125996"/>
+                  <a:pt x="1688482" y="281419"/>
+                </a:cubicBezTo>
+                <a:lnTo>
+                  <a:pt x="1688482" y="1407063"/>
+                </a:lnTo>
+                <a:cubicBezTo>
+                  <a:pt x="1688482" y="1562486"/>
+                  <a:pt x="1562486" y="1688482"/>
+                  <a:pt x="1407063" y="1688482"/>
+                </a:cubicBezTo>
+                <a:lnTo>
+                  <a:pt x="281419" y="1688482"/>
+                </a:lnTo>
+                <a:cubicBezTo>
+                  <a:pt x="125996" y="1688482"/>
+                  <a:pt x="0" y="1562486"/>
+                  <a:pt x="0" y="1407063"/>
+                </a:cubicBezTo>
+                <a:lnTo>
+                  <a:pt x="0" y="281419"/>
+                </a:lnTo>
+                <a:close/>
+              </a:path>
+            </a:pathLst>
+          </a:custGeom>
+        </p:spPr>
+        <p:style>
+          <a:lnRef idx="2">
+            <a:schemeClr val="lt1">
+              <a:hueOff val="0"/>
+              <a:satOff val="0"/>
+              <a:lumOff val="0"/>
+              <a:alphaOff val="0"/>
+            </a:schemeClr>
+          </a:lnRef>
+          <a:fillRef idx="1">
+            <a:schemeClr val="accent3">
+              <a:hueOff val="0"/>
+              <a:satOff val="0"/>
+              <a:lumOff val="0"/>
+              <a:alphaOff val="0"/>
+            </a:schemeClr>
+          </a:fillRef>
+          <a:effectRef idx="0">
+            <a:schemeClr val="accent3">
+              <a:hueOff val="0"/>
+              <a:satOff val="0"/>
+              <a:lumOff val="0"/>
+              <a:alphaOff val="0"/>
+            </a:schemeClr>
+          </a:effectRef>
+          <a:fontRef idx="minor">
+            <a:schemeClr val="lt1"/>
+          </a:fontRef>
+        </p:style>
+        <p:txBody>
+          <a:bodyPr spcFirstLastPara="0" vert="horz" wrap="square" lIns="173865" tIns="173865" rIns="173865" bIns="173865" numCol="1" spcCol="1270" anchor="ctr" anchorCtr="0">
+            <a:noAutofit/>
+          </a:bodyPr>
+          <a:lstStyle/>
+          <a:p>
+            <a:pPr lvl="0" algn="ctr" defTabSz="1066800">
+              <a:lnSpc>
+                <a:spcPct val="90000"/>
+              </a:lnSpc>
+              <a:spcBef>
+                <a:spcPct val="0"/>
+              </a:spcBef>
+              <a:spcAft>
+                <a:spcPct val="35000"/>
+              </a:spcAft>
+            </a:pPr>
+            <a:r>
+              <a:rPr lang="fr-FR" sz="1600" smtClean="0"/>
+              <a:t>Construit dans </a:t>
+            </a:r>
+            <a:r>
+              <a:rPr lang="fr-FR" sz="1600"/>
+              <a:t>SynApps</a:t>
+            </a:r>
+            <a:endParaRPr lang="en-GB" sz="1600"/>
+          </a:p>
+        </p:txBody>
+      </p:sp>
+      <p:sp>
+        <p:nvSpPr>
+          <p:cNvPr id="12" name="Forme libre 11"/>
+          <p:cNvSpPr/>
+          <p:nvPr/>
+        </p:nvSpPr>
+        <p:spPr>
+          <a:xfrm>
+            <a:off x="2759114" y="3161073"/>
+            <a:ext cx="1688482" cy="1688482"/>
+          </a:xfrm>
+          <a:custGeom>
+            <a:avLst/>
+            <a:gdLst>
+              <a:gd name="connsiteX0" fmla="*/ 0 w 1688482"/>
+              <a:gd name="connsiteY0" fmla="*/ 281419 h 1688482"/>
+              <a:gd name="connsiteX1" fmla="*/ 281419 w 1688482"/>
+              <a:gd name="connsiteY1" fmla="*/ 0 h 1688482"/>
+              <a:gd name="connsiteX2" fmla="*/ 1407063 w 1688482"/>
+              <a:gd name="connsiteY2" fmla="*/ 0 h 1688482"/>
+              <a:gd name="connsiteX3" fmla="*/ 1688482 w 1688482"/>
+              <a:gd name="connsiteY3" fmla="*/ 281419 h 1688482"/>
+              <a:gd name="connsiteX4" fmla="*/ 1688482 w 1688482"/>
+              <a:gd name="connsiteY4" fmla="*/ 1407063 h 1688482"/>
+              <a:gd name="connsiteX5" fmla="*/ 1407063 w 1688482"/>
+              <a:gd name="connsiteY5" fmla="*/ 1688482 h 1688482"/>
+              <a:gd name="connsiteX6" fmla="*/ 281419 w 1688482"/>
+              <a:gd name="connsiteY6" fmla="*/ 1688482 h 1688482"/>
+              <a:gd name="connsiteX7" fmla="*/ 0 w 1688482"/>
+              <a:gd name="connsiteY7" fmla="*/ 1407063 h 1688482"/>
+              <a:gd name="connsiteX8" fmla="*/ 0 w 1688482"/>
+              <a:gd name="connsiteY8" fmla="*/ 281419 h 1688482"/>
+            </a:gdLst>
+            <a:ahLst/>
+            <a:cxnLst>
+              <a:cxn ang="0">
+                <a:pos x="connsiteX0" y="connsiteY0"/>
+              </a:cxn>
+              <a:cxn ang="0">
+                <a:pos x="connsiteX1" y="connsiteY1"/>
+              </a:cxn>
+              <a:cxn ang="0">
+                <a:pos x="connsiteX2" y="connsiteY2"/>
+              </a:cxn>
+              <a:cxn ang="0">
+                <a:pos x="connsiteX3" y="connsiteY3"/>
+              </a:cxn>
+              <a:cxn ang="0">
+                <a:pos x="connsiteX4" y="connsiteY4"/>
+              </a:cxn>
+              <a:cxn ang="0">
+                <a:pos x="connsiteX5" y="connsiteY5"/>
+              </a:cxn>
+              <a:cxn ang="0">
+                <a:pos x="connsiteX6" y="connsiteY6"/>
+              </a:cxn>
+              <a:cxn ang="0">
+                <a:pos x="connsiteX7" y="connsiteY7"/>
+              </a:cxn>
+              <a:cxn ang="0">
+                <a:pos x="connsiteX8" y="connsiteY8"/>
+              </a:cxn>
+            </a:cxnLst>
+            <a:rect l="l" t="t" r="r" b="b"/>
+            <a:pathLst>
+              <a:path w="1688482" h="1688482">
+                <a:moveTo>
+                  <a:pt x="0" y="281419"/>
+                </a:moveTo>
+                <a:cubicBezTo>
+                  <a:pt x="0" y="125996"/>
+                  <a:pt x="125996" y="0"/>
+                  <a:pt x="281419" y="0"/>
+                </a:cubicBezTo>
+                <a:lnTo>
+                  <a:pt x="1407063" y="0"/>
+                </a:lnTo>
+                <a:cubicBezTo>
+                  <a:pt x="1562486" y="0"/>
+                  <a:pt x="1688482" y="125996"/>
+                  <a:pt x="1688482" y="281419"/>
+                </a:cubicBezTo>
+                <a:lnTo>
+                  <a:pt x="1688482" y="1407063"/>
+                </a:lnTo>
+                <a:cubicBezTo>
+                  <a:pt x="1688482" y="1562486"/>
+                  <a:pt x="1562486" y="1688482"/>
+                  <a:pt x="1407063" y="1688482"/>
+                </a:cubicBezTo>
+                <a:lnTo>
+                  <a:pt x="281419" y="1688482"/>
+                </a:lnTo>
+                <a:cubicBezTo>
+                  <a:pt x="125996" y="1688482"/>
+                  <a:pt x="0" y="1562486"/>
+                  <a:pt x="0" y="1407063"/>
+                </a:cubicBezTo>
+                <a:lnTo>
+                  <a:pt x="0" y="281419"/>
+                </a:lnTo>
+                <a:close/>
+              </a:path>
+            </a:pathLst>
+          </a:custGeom>
+        </p:spPr>
+        <p:style>
+          <a:lnRef idx="2">
+            <a:schemeClr val="lt1">
+              <a:hueOff val="0"/>
+              <a:satOff val="0"/>
+              <a:lumOff val="0"/>
+              <a:alphaOff val="0"/>
+            </a:schemeClr>
+          </a:lnRef>
+          <a:fillRef idx="1">
+            <a:schemeClr val="accent4">
+              <a:hueOff val="0"/>
+              <a:satOff val="0"/>
+              <a:lumOff val="0"/>
+              <a:alphaOff val="0"/>
+            </a:schemeClr>
+          </a:fillRef>
+          <a:effectRef idx="0">
+            <a:schemeClr val="accent4">
+              <a:hueOff val="0"/>
+              <a:satOff val="0"/>
+              <a:lumOff val="0"/>
+              <a:alphaOff val="0"/>
+            </a:schemeClr>
+          </a:effectRef>
+          <a:fontRef idx="minor">
+            <a:schemeClr val="lt1"/>
+          </a:fontRef>
+        </p:style>
+        <p:txBody>
+          <a:bodyPr spcFirstLastPara="0" vert="horz" wrap="square" lIns="173865" tIns="173865" rIns="173865" bIns="173865" numCol="1" spcCol="1270" anchor="ctr" anchorCtr="0">
+            <a:noAutofit/>
+          </a:bodyPr>
+          <a:lstStyle/>
+          <a:p>
+            <a:pPr lvl="0" algn="ctr" defTabSz="1066800">
+              <a:lnSpc>
+                <a:spcPct val="90000"/>
+              </a:lnSpc>
+              <a:spcBef>
+                <a:spcPct val="0"/>
+              </a:spcBef>
+              <a:spcAft>
+                <a:spcPct val="35000"/>
+              </a:spcAft>
+            </a:pPr>
+            <a:r>
+              <a:rPr lang="fr-FR" sz="1600" smtClean="0"/>
+              <a:t>Livré avec SynApps</a:t>
+            </a:r>
+          </a:p>
+          <a:p>
+            <a:pPr lvl="0" algn="ctr" defTabSz="1066800">
+              <a:lnSpc>
+                <a:spcPct val="90000"/>
+              </a:lnSpc>
+              <a:spcBef>
+                <a:spcPct val="0"/>
+              </a:spcBef>
+              <a:spcAft>
+                <a:spcPct val="35000"/>
+              </a:spcAft>
+            </a:pPr>
+            <a:r>
+              <a:rPr lang="fr-FR" sz="1600" smtClean="0"/>
+              <a:t>Nécessite une source de donnée</a:t>
+            </a:r>
+            <a:endParaRPr lang="en-GB" sz="1600" kern="1200"/>
+          </a:p>
+        </p:txBody>
+      </p:sp>
+      <p:sp>
+        <p:nvSpPr>
+          <p:cNvPr id="13" name="Forme libre 12"/>
+          <p:cNvSpPr/>
+          <p:nvPr/>
+        </p:nvSpPr>
+        <p:spPr>
+          <a:xfrm>
+            <a:off x="4743082" y="3161073"/>
+            <a:ext cx="1688482" cy="1688482"/>
+          </a:xfrm>
+          <a:custGeom>
+            <a:avLst/>
+            <a:gdLst>
+              <a:gd name="connsiteX0" fmla="*/ 0 w 1688482"/>
+              <a:gd name="connsiteY0" fmla="*/ 281419 h 1688482"/>
+              <a:gd name="connsiteX1" fmla="*/ 281419 w 1688482"/>
+              <a:gd name="connsiteY1" fmla="*/ 0 h 1688482"/>
+              <a:gd name="connsiteX2" fmla="*/ 1407063 w 1688482"/>
+              <a:gd name="connsiteY2" fmla="*/ 0 h 1688482"/>
+              <a:gd name="connsiteX3" fmla="*/ 1688482 w 1688482"/>
+              <a:gd name="connsiteY3" fmla="*/ 281419 h 1688482"/>
+              <a:gd name="connsiteX4" fmla="*/ 1688482 w 1688482"/>
+              <a:gd name="connsiteY4" fmla="*/ 1407063 h 1688482"/>
+              <a:gd name="connsiteX5" fmla="*/ 1407063 w 1688482"/>
+              <a:gd name="connsiteY5" fmla="*/ 1688482 h 1688482"/>
+              <a:gd name="connsiteX6" fmla="*/ 281419 w 1688482"/>
+              <a:gd name="connsiteY6" fmla="*/ 1688482 h 1688482"/>
+              <a:gd name="connsiteX7" fmla="*/ 0 w 1688482"/>
+              <a:gd name="connsiteY7" fmla="*/ 1407063 h 1688482"/>
+              <a:gd name="connsiteX8" fmla="*/ 0 w 1688482"/>
+              <a:gd name="connsiteY8" fmla="*/ 281419 h 1688482"/>
+            </a:gdLst>
+            <a:ahLst/>
+            <a:cxnLst>
+              <a:cxn ang="0">
+                <a:pos x="connsiteX0" y="connsiteY0"/>
+              </a:cxn>
+              <a:cxn ang="0">
+                <a:pos x="connsiteX1" y="connsiteY1"/>
+              </a:cxn>
+              <a:cxn ang="0">
+                <a:pos x="connsiteX2" y="connsiteY2"/>
+              </a:cxn>
+              <a:cxn ang="0">
+                <a:pos x="connsiteX3" y="connsiteY3"/>
+              </a:cxn>
+              <a:cxn ang="0">
+                <a:pos x="connsiteX4" y="connsiteY4"/>
+              </a:cxn>
+              <a:cxn ang="0">
+                <a:pos x="connsiteX5" y="connsiteY5"/>
+              </a:cxn>
+              <a:cxn ang="0">
+                <a:pos x="connsiteX6" y="connsiteY6"/>
+              </a:cxn>
+              <a:cxn ang="0">
+                <a:pos x="connsiteX7" y="connsiteY7"/>
+              </a:cxn>
+              <a:cxn ang="0">
+                <a:pos x="connsiteX8" y="connsiteY8"/>
+              </a:cxn>
+            </a:cxnLst>
+            <a:rect l="l" t="t" r="r" b="b"/>
+            <a:pathLst>
+              <a:path w="1688482" h="1688482">
+                <a:moveTo>
+                  <a:pt x="0" y="281419"/>
+                </a:moveTo>
+                <a:cubicBezTo>
+                  <a:pt x="0" y="125996"/>
+                  <a:pt x="125996" y="0"/>
+                  <a:pt x="281419" y="0"/>
+                </a:cubicBezTo>
+                <a:lnTo>
+                  <a:pt x="1407063" y="0"/>
+                </a:lnTo>
+                <a:cubicBezTo>
+                  <a:pt x="1562486" y="0"/>
+                  <a:pt x="1688482" y="125996"/>
+                  <a:pt x="1688482" y="281419"/>
+                </a:cubicBezTo>
+                <a:lnTo>
+                  <a:pt x="1688482" y="1407063"/>
+                </a:lnTo>
+                <a:cubicBezTo>
+                  <a:pt x="1688482" y="1562486"/>
+                  <a:pt x="1562486" y="1688482"/>
+                  <a:pt x="1407063" y="1688482"/>
+                </a:cubicBezTo>
+                <a:lnTo>
+                  <a:pt x="281419" y="1688482"/>
+                </a:lnTo>
+                <a:cubicBezTo>
+                  <a:pt x="125996" y="1688482"/>
+                  <a:pt x="0" y="1562486"/>
+                  <a:pt x="0" y="1407063"/>
+                </a:cubicBezTo>
+                <a:lnTo>
+                  <a:pt x="0" y="281419"/>
+                </a:lnTo>
+                <a:close/>
+              </a:path>
+            </a:pathLst>
+          </a:custGeom>
+        </p:spPr>
+        <p:style>
+          <a:lnRef idx="2">
+            <a:schemeClr val="lt1">
+              <a:hueOff val="0"/>
+              <a:satOff val="0"/>
+              <a:lumOff val="0"/>
+              <a:alphaOff val="0"/>
+            </a:schemeClr>
+          </a:lnRef>
+          <a:fillRef idx="1">
+            <a:schemeClr val="accent5">
+              <a:hueOff val="0"/>
+              <a:satOff val="0"/>
+              <a:lumOff val="0"/>
+              <a:alphaOff val="0"/>
+            </a:schemeClr>
+          </a:fillRef>
+          <a:effectRef idx="0">
+            <a:schemeClr val="accent5">
+              <a:hueOff val="0"/>
+              <a:satOff val="0"/>
+              <a:lumOff val="0"/>
+              <a:alphaOff val="0"/>
+            </a:schemeClr>
+          </a:effectRef>
+          <a:fontRef idx="minor">
+            <a:schemeClr val="lt1"/>
+          </a:fontRef>
+        </p:style>
+        <p:txBody>
+          <a:bodyPr spcFirstLastPara="0" vert="horz" wrap="square" lIns="173865" tIns="173865" rIns="173865" bIns="173865" numCol="1" spcCol="1270" anchor="ctr" anchorCtr="0">
+            <a:noAutofit/>
+          </a:bodyPr>
+          <a:lstStyle/>
+          <a:p>
+            <a:pPr lvl="0" defTabSz="1066800">
+              <a:lnSpc>
+                <a:spcPct val="90000"/>
+              </a:lnSpc>
+              <a:spcBef>
+                <a:spcPct val="0"/>
+              </a:spcBef>
+              <a:spcAft>
+                <a:spcPct val="35000"/>
+              </a:spcAft>
+            </a:pPr>
+            <a:r>
+              <a:rPr lang="fr-FR" sz="1600" smtClean="0"/>
+              <a:t>Construit dans </a:t>
+            </a:r>
+            <a:r>
+              <a:rPr lang="fr-FR" sz="1600"/>
+              <a:t>SynApps </a:t>
+            </a:r>
+            <a:r>
+              <a:rPr lang="fr-FR" sz="1600" smtClean="0"/>
+              <a:t>Nécessite </a:t>
+            </a:r>
+            <a:r>
+              <a:rPr lang="fr-FR" sz="1600"/>
+              <a:t>une source de donnée</a:t>
+            </a:r>
+            <a:endParaRPr lang="en-GB" sz="1600"/>
+          </a:p>
+          <a:p>
+            <a:pPr lvl="0" algn="ctr" defTabSz="1066800">
+              <a:lnSpc>
+                <a:spcPct val="90000"/>
+              </a:lnSpc>
+              <a:spcBef>
+                <a:spcPct val="0"/>
+              </a:spcBef>
+              <a:spcAft>
+                <a:spcPct val="35000"/>
+              </a:spcAft>
+            </a:pPr>
+            <a:endParaRPr lang="fr-FR" sz="2000"/>
+          </a:p>
+        </p:txBody>
+      </p:sp>
+      <p:sp>
+        <p:nvSpPr>
+          <p:cNvPr id="7" name="ZoneTexte 6"/>
+          <p:cNvSpPr txBox="1"/>
+          <p:nvPr/>
+        </p:nvSpPr>
+        <p:spPr>
+          <a:xfrm>
+            <a:off x="4081191" y="593125"/>
+            <a:ext cx="1028295" cy="369332"/>
+          </a:xfrm>
+          <a:prstGeom prst="rect">
+            <a:avLst/>
+          </a:prstGeom>
+          <a:noFill/>
+        </p:spPr>
+        <p:txBody>
+          <a:bodyPr wrap="none" rtlCol="0">
+            <a:spAutoFit/>
+          </a:bodyPr>
+          <a:lstStyle/>
+          <a:p>
+            <a:r>
+              <a:rPr lang="fr-FR" smtClean="0">
+                <a:solidFill>
+                  <a:srgbClr val="979797"/>
+                </a:solidFill>
+              </a:rPr>
+              <a:t>Standard</a:t>
+            </a:r>
+            <a:endParaRPr lang="en-GB">
+              <a:solidFill>
+                <a:srgbClr val="979797"/>
+              </a:solidFill>
+            </a:endParaRPr>
+          </a:p>
+        </p:txBody>
+      </p:sp>
+      <p:sp>
+        <p:nvSpPr>
+          <p:cNvPr id="14" name="ZoneTexte 13"/>
+          <p:cNvSpPr txBox="1"/>
+          <p:nvPr/>
+        </p:nvSpPr>
+        <p:spPr>
+          <a:xfrm>
+            <a:off x="1821016" y="2828665"/>
+            <a:ext cx="642612" cy="369332"/>
+          </a:xfrm>
+          <a:prstGeom prst="rect">
+            <a:avLst/>
+          </a:prstGeom>
+          <a:noFill/>
+        </p:spPr>
+        <p:txBody>
+          <a:bodyPr wrap="none" rtlCol="0">
+            <a:spAutoFit/>
+          </a:bodyPr>
+          <a:lstStyle/>
+          <a:p>
+            <a:r>
+              <a:rPr lang="fr-FR" smtClean="0">
+                <a:solidFill>
+                  <a:srgbClr val="979797"/>
+                </a:solidFill>
+              </a:rPr>
+              <a:t>Natif</a:t>
+            </a:r>
+            <a:endParaRPr lang="en-GB">
+              <a:solidFill>
+                <a:srgbClr val="979797"/>
+              </a:solidFill>
+            </a:endParaRPr>
+          </a:p>
+        </p:txBody>
+      </p:sp>
+      <p:sp>
+        <p:nvSpPr>
+          <p:cNvPr id="15" name="ZoneTexte 14"/>
+          <p:cNvSpPr txBox="1"/>
+          <p:nvPr/>
+        </p:nvSpPr>
+        <p:spPr>
+          <a:xfrm>
+            <a:off x="6727050" y="2828665"/>
+            <a:ext cx="1190454" cy="369332"/>
+          </a:xfrm>
+          <a:prstGeom prst="rect">
+            <a:avLst/>
+          </a:prstGeom>
+          <a:noFill/>
+        </p:spPr>
+        <p:txBody>
+          <a:bodyPr wrap="none" rtlCol="0">
+            <a:spAutoFit/>
+          </a:bodyPr>
+          <a:lstStyle/>
+          <a:p>
+            <a:r>
+              <a:rPr lang="fr-FR" smtClean="0">
+                <a:solidFill>
+                  <a:srgbClr val="979797"/>
+                </a:solidFill>
+              </a:rPr>
+              <a:t>Composite</a:t>
+            </a:r>
+            <a:endParaRPr lang="en-GB">
+              <a:solidFill>
+                <a:srgbClr val="979797"/>
+              </a:solidFill>
+            </a:endParaRPr>
+          </a:p>
+        </p:txBody>
+      </p:sp>
+      <p:sp>
+        <p:nvSpPr>
+          <p:cNvPr id="16" name="ZoneTexte 15"/>
+          <p:cNvSpPr txBox="1"/>
+          <p:nvPr/>
+        </p:nvSpPr>
+        <p:spPr>
+          <a:xfrm>
+            <a:off x="4184616" y="5123935"/>
+            <a:ext cx="821443" cy="369332"/>
+          </a:xfrm>
+          <a:prstGeom prst="rect">
+            <a:avLst/>
+          </a:prstGeom>
+          <a:noFill/>
+        </p:spPr>
+        <p:txBody>
+          <a:bodyPr wrap="none" rtlCol="0">
+            <a:spAutoFit/>
+          </a:bodyPr>
+          <a:lstStyle/>
+          <a:p>
+            <a:r>
+              <a:rPr lang="fr-FR" smtClean="0">
+                <a:solidFill>
+                  <a:srgbClr val="979797"/>
+                </a:solidFill>
+              </a:rPr>
+              <a:t>Métier</a:t>
+            </a:r>
+            <a:endParaRPr lang="en-GB">
+              <a:solidFill>
+                <a:srgbClr val="979797"/>
+              </a:solidFill>
+            </a:endParaRPr>
+          </a:p>
+        </p:txBody>
+      </p:sp>
+    </p:spTree>
+    <p:extLst>
+      <p:ext uri="{BB962C8B-B14F-4D97-AF65-F5344CB8AC3E}">
+        <p14:creationId xmlns:p14="http://schemas.microsoft.com/office/powerpoint/2010/main" val="1707282337"/>
+      </p:ext>
+    </p:extLst>
+  </p:cSld>
+  <p:clrMapOvr>
+    <a:masterClrMapping/>
+  </p:clrMapOvr>
+</p:sld>
+</file>
+
 <file path=ppt/theme/theme1.xml><?xml version="1.0" encoding="utf-8"?>
 <a:theme xmlns:a="http://schemas.openxmlformats.org/drawingml/2006/main" name="Thème Office">
   <a:themeElements>

</xml_diff>